<commit_message>
removed agenda from ppt
</commit_message>
<xml_diff>
--- a/intro_trees/Decision Trees.pptx
+++ b/intro_trees/Decision Trees.pptx
@@ -5,36 +5,35 @@
     <p:sldMasterId id="2147483648" r:id="rId1"/>
   </p:sldMasterIdLst>
   <p:notesMasterIdLst>
-    <p:notesMasterId r:id="rId12"/>
+    <p:notesMasterId r:id="rId11"/>
   </p:notesMasterIdLst>
   <p:sldIdLst>
     <p:sldId id="256" r:id="rId2"/>
-    <p:sldId id="270" r:id="rId3"/>
-    <p:sldId id="272" r:id="rId4"/>
-    <p:sldId id="273" r:id="rId5"/>
-    <p:sldId id="274" r:id="rId6"/>
-    <p:sldId id="259" r:id="rId7"/>
-    <p:sldId id="261" r:id="rId8"/>
-    <p:sldId id="260" r:id="rId9"/>
-    <p:sldId id="264" r:id="rId10"/>
-    <p:sldId id="268" r:id="rId11"/>
+    <p:sldId id="272" r:id="rId3"/>
+    <p:sldId id="273" r:id="rId4"/>
+    <p:sldId id="274" r:id="rId5"/>
+    <p:sldId id="259" r:id="rId6"/>
+    <p:sldId id="261" r:id="rId7"/>
+    <p:sldId id="260" r:id="rId8"/>
+    <p:sldId id="264" r:id="rId9"/>
+    <p:sldId id="268" r:id="rId10"/>
   </p:sldIdLst>
   <p:sldSz cx="12192000" cy="6858000"/>
   <p:notesSz cx="6858000" cy="9144000"/>
   <p:embeddedFontLst>
     <p:embeddedFont>
       <p:font typeface="Calibri" panose="020F0502020204030204" pitchFamily="34" charset="0"/>
-      <p:regular r:id="rId13"/>
-      <p:bold r:id="rId14"/>
-      <p:italic r:id="rId15"/>
-      <p:boldItalic r:id="rId16"/>
+      <p:regular r:id="rId12"/>
+      <p:bold r:id="rId13"/>
+      <p:italic r:id="rId14"/>
+      <p:boldItalic r:id="rId15"/>
     </p:embeddedFont>
     <p:embeddedFont>
       <p:font typeface="Roboto" panose="02000000000000000000" pitchFamily="2" charset="0"/>
-      <p:regular r:id="rId17"/>
-      <p:bold r:id="rId18"/>
-      <p:italic r:id="rId19"/>
-      <p:boldItalic r:id="rId20"/>
+      <p:regular r:id="rId16"/>
+      <p:bold r:id="rId17"/>
+      <p:italic r:id="rId18"/>
+      <p:boldItalic r:id="rId19"/>
     </p:embeddedFont>
   </p:embeddedFontLst>
   <p:defaultTextStyle>
@@ -267,8 +266,11 @@
     </a:lvl9pPr>
   </p:defaultTextStyle>
   <p:extLst>
+    <p:ext uri="{EFAFB233-063F-42B5-8137-9DF3F51BA10A}">
+      <p15:sldGuideLst xmlns:p15="http://schemas.microsoft.com/office/powerpoint/2012/main"/>
+    </p:ext>
     <p:ext uri="http://customooxmlschemas.google.com/">
-      <go:slidesCustomData xmlns:go="http://customooxmlschemas.google.com/" xmlns:ahyp="http://schemas.microsoft.com/office/drawing/2018/hyperlinkcolor" xmlns:p15="http://schemas.microsoft.com/office/powerpoint/2012/main" xmlns:p14="http://schemas.microsoft.com/office/powerpoint/2010/main" xmlns:com="http://schemas.openxmlformats.org/drawingml/2006/compatibility" xmlns:pvml="urn:schemas-microsoft-com:office:powerpoint" xmlns:v="urn:schemas-microsoft-com:vml" xmlns:o="urn:schemas-microsoft-com:office:office" xmlns:dgm="http://schemas.openxmlformats.org/drawingml/2006/diagram" xmlns:c="http://schemas.openxmlformats.org/drawingml/2006/chart" xmlns:mv="urn:schemas-microsoft-com:mac:vml" xmlns:mc="http://schemas.openxmlformats.org/markup-compatibility/2006" xmlns="" r:id="rId23" roundtripDataSignature="AMtx7mhuB30mvxWtI/cELL9uLKwmpKLwJA=="/>
+      <go:slidesCustomData xmlns="" xmlns:mc="http://schemas.openxmlformats.org/markup-compatibility/2006" xmlns:mv="urn:schemas-microsoft-com:mac:vml" xmlns:c="http://schemas.openxmlformats.org/drawingml/2006/chart" xmlns:dgm="http://schemas.openxmlformats.org/drawingml/2006/diagram" xmlns:o="urn:schemas-microsoft-com:office:office" xmlns:v="urn:schemas-microsoft-com:vml" xmlns:pvml="urn:schemas-microsoft-com:office:powerpoint" xmlns:com="http://schemas.openxmlformats.org/drawingml/2006/compatibility" xmlns:p14="http://schemas.microsoft.com/office/powerpoint/2010/main" xmlns:p15="http://schemas.microsoft.com/office/powerpoint/2012/main" xmlns:ahyp="http://schemas.microsoft.com/office/drawing/2018/hyperlinkcolor" xmlns:go="http://customooxmlschemas.google.com/" r:id="rId23" roundtripDataSignature="AMtx7mhuB30mvxWtI/cELL9uLKwmpKLwJA=="/>
     </p:ext>
   </p:extLst>
 </p:presentation>
@@ -11843,12 +11845,12 @@
 </p:sld>
 </file>
 
-<file path=ppt/slides/slide10.xml><?xml version="1.0" encoding="utf-8"?>
+<file path=ppt/slides/slide2.xml><?xml version="1.0" encoding="utf-8"?>
 <p:sld xmlns:a="http://schemas.openxmlformats.org/drawingml/2006/main" xmlns:r="http://schemas.openxmlformats.org/officeDocument/2006/relationships" xmlns:p="http://schemas.openxmlformats.org/presentationml/2006/main">
   <p:cSld>
     <p:spTree>
       <p:nvGrpSpPr>
-        <p:cNvPr id="1" name="Shape 193"/>
+        <p:cNvPr id="1" name=""/>
         <p:cNvGrpSpPr/>
         <p:nvPr/>
       </p:nvGrpSpPr>
@@ -11862,14 +11864,20 @@
       </p:grpSpPr>
       <p:sp>
         <p:nvSpPr>
-          <p:cNvPr id="194" name="Google Shape;194;g1633e0d46eb_0_94"/>
+          <p:cNvPr id="4" name="Rectangle 3">
+            <a:extLst>
+              <a:ext uri="{FF2B5EF4-FFF2-40B4-BE49-F238E27FC236}">
+                <a16:creationId xmlns:a16="http://schemas.microsoft.com/office/drawing/2014/main" id="{89A20CDD-996E-91BF-B8A6-1A31751E99D0}"/>
+              </a:ext>
+            </a:extLst>
+          </p:cNvPr>
           <p:cNvSpPr/>
           <p:nvPr/>
         </p:nvSpPr>
         <p:spPr>
           <a:xfrm>
             <a:off x="0" y="0"/>
-            <a:ext cx="12192000" cy="721800"/>
+            <a:ext cx="12192000" cy="2612571"/>
           </a:xfrm>
           <a:prstGeom prst="rect">
             <a:avLst/>
@@ -11881,93 +11889,89 @@
             <a:noFill/>
           </a:ln>
         </p:spPr>
+        <p:style>
+          <a:lnRef idx="2">
+            <a:schemeClr val="accent1">
+              <a:shade val="50000"/>
+            </a:schemeClr>
+          </a:lnRef>
+          <a:fillRef idx="1">
+            <a:schemeClr val="accent1"/>
+          </a:fillRef>
+          <a:effectRef idx="0">
+            <a:schemeClr val="accent1"/>
+          </a:effectRef>
+          <a:fontRef idx="minor">
+            <a:schemeClr val="lt1"/>
+          </a:fontRef>
+        </p:style>
         <p:txBody>
-          <a:bodyPr spcFirstLastPara="1" wrap="square" lIns="91425" tIns="45700" rIns="91425" bIns="45700" anchor="ctr" anchorCtr="0">
-            <a:noAutofit/>
-          </a:bodyPr>
+          <a:bodyPr rtlCol="0" anchor="ctr"/>
           <a:lstStyle/>
           <a:p>
-            <a:pPr marL="0" marR="0" lvl="0" indent="0" algn="ctr" rtl="0">
-              <a:spcBef>
-                <a:spcPts val="0"/>
-              </a:spcBef>
-              <a:spcAft>
-                <a:spcPts val="0"/>
-              </a:spcAft>
-              <a:buNone/>
-            </a:pPr>
-            <a:endParaRPr sz="1800">
-              <a:solidFill>
-                <a:schemeClr val="lt1"/>
-              </a:solidFill>
-              <a:latin typeface="Calibri"/>
-              <a:ea typeface="Calibri"/>
-              <a:cs typeface="Calibri"/>
-              <a:sym typeface="Calibri"/>
-            </a:endParaRPr>
+            <a:pPr algn="ctr"/>
+            <a:endParaRPr lang="en-US"/>
           </a:p>
         </p:txBody>
       </p:sp>
       <p:sp>
         <p:nvSpPr>
-          <p:cNvPr id="195" name="Google Shape;195;g1633e0d46eb_0_94"/>
+          <p:cNvPr id="5" name="TextBox 4">
+            <a:extLst>
+              <a:ext uri="{FF2B5EF4-FFF2-40B4-BE49-F238E27FC236}">
+                <a16:creationId xmlns:a16="http://schemas.microsoft.com/office/drawing/2014/main" id="{DAC887E5-C0CA-AD92-E3B2-5AD3F64ACA7E}"/>
+              </a:ext>
+            </a:extLst>
+          </p:cNvPr>
           <p:cNvSpPr txBox="1"/>
           <p:nvPr/>
         </p:nvSpPr>
         <p:spPr>
           <a:xfrm>
-            <a:off x="427977" y="21757"/>
-            <a:ext cx="11358900" cy="646500"/>
+            <a:off x="32657" y="957886"/>
+            <a:ext cx="12115800" cy="1015663"/>
           </a:xfrm>
           <a:prstGeom prst="rect">
             <a:avLst/>
           </a:prstGeom>
           <a:noFill/>
-          <a:ln>
-            <a:noFill/>
-          </a:ln>
         </p:spPr>
         <p:txBody>
-          <a:bodyPr spcFirstLastPara="1" wrap="square" lIns="91425" tIns="45700" rIns="91425" bIns="45700" anchor="t" anchorCtr="0">
+          <a:bodyPr wrap="square" rtlCol="0">
             <a:spAutoFit/>
           </a:bodyPr>
           <a:lstStyle/>
           <a:p>
-            <a:pPr marL="0" marR="0" lvl="0" indent="0" algn="l" rtl="0">
-              <a:spcBef>
-                <a:spcPts val="0"/>
-              </a:spcBef>
-              <a:spcAft>
-                <a:spcPts val="0"/>
-              </a:spcAft>
-              <a:buNone/>
-            </a:pPr>
+            <a:pPr algn="ctr"/>
             <a:r>
-              <a:rPr lang="en-US" sz="3600" dirty="0">
+              <a:rPr lang="en-US" sz="6000" dirty="0">
                 <a:solidFill>
-                  <a:schemeClr val="lt1"/>
+                  <a:schemeClr val="bg1"/>
                 </a:solidFill>
-                <a:latin typeface="Calibri"/>
-                <a:ea typeface="Calibri"/>
-                <a:cs typeface="Calibri"/>
-                <a:sym typeface="Calibri"/>
+                <a:latin typeface="Calibri" panose="020F0502020204030204" pitchFamily="34" charset="0"/>
+                <a:cs typeface="Calibri" panose="020F0502020204030204" pitchFamily="34" charset="0"/>
               </a:rPr>
-              <a:t>Advantages and Disadvantages of Decision Tree</a:t>
+              <a:t>Introduction to Decision Trees</a:t>
             </a:r>
-            <a:endParaRPr dirty="0"/>
           </a:p>
         </p:txBody>
       </p:sp>
       <p:sp>
         <p:nvSpPr>
-          <p:cNvPr id="196" name="Google Shape;196;g1633e0d46eb_0_94"/>
+          <p:cNvPr id="6" name="Rectangle 5">
+            <a:extLst>
+              <a:ext uri="{FF2B5EF4-FFF2-40B4-BE49-F238E27FC236}">
+                <a16:creationId xmlns:a16="http://schemas.microsoft.com/office/drawing/2014/main" id="{EA5A31A4-0B5E-F927-F661-B75E5F783AD1}"/>
+              </a:ext>
+            </a:extLst>
+          </p:cNvPr>
           <p:cNvSpPr/>
           <p:nvPr/>
         </p:nvSpPr>
         <p:spPr>
           <a:xfrm>
             <a:off x="0" y="6604000"/>
-            <a:ext cx="12192000" cy="254100"/>
+            <a:ext cx="12192000" cy="254000"/>
           </a:xfrm>
           <a:prstGeom prst="rect">
             <a:avLst/>
@@ -11979,449 +11983,98 @@
             <a:noFill/>
           </a:ln>
         </p:spPr>
+        <p:style>
+          <a:lnRef idx="2">
+            <a:schemeClr val="accent1">
+              <a:shade val="50000"/>
+            </a:schemeClr>
+          </a:lnRef>
+          <a:fillRef idx="1">
+            <a:schemeClr val="accent1"/>
+          </a:fillRef>
+          <a:effectRef idx="0">
+            <a:schemeClr val="accent1"/>
+          </a:effectRef>
+          <a:fontRef idx="minor">
+            <a:schemeClr val="lt1"/>
+          </a:fontRef>
+        </p:style>
         <p:txBody>
-          <a:bodyPr spcFirstLastPara="1" wrap="square" lIns="91425" tIns="45700" rIns="91425" bIns="45700" anchor="ctr" anchorCtr="0">
-            <a:noAutofit/>
-          </a:bodyPr>
+          <a:bodyPr rtlCol="0" anchor="ctr"/>
           <a:lstStyle/>
           <a:p>
-            <a:pPr marL="0" marR="0" lvl="0" indent="0" algn="ctr" rtl="0">
-              <a:spcBef>
-                <a:spcPts val="0"/>
-              </a:spcBef>
-              <a:spcAft>
-                <a:spcPts val="0"/>
-              </a:spcAft>
-              <a:buNone/>
-            </a:pPr>
-            <a:endParaRPr sz="1800">
-              <a:solidFill>
-                <a:schemeClr val="lt1"/>
-              </a:solidFill>
-              <a:latin typeface="Calibri"/>
-              <a:ea typeface="Calibri"/>
-              <a:cs typeface="Calibri"/>
-              <a:sym typeface="Calibri"/>
-            </a:endParaRPr>
+            <a:pPr algn="ctr"/>
+            <a:endParaRPr lang="en-US"/>
           </a:p>
         </p:txBody>
       </p:sp>
       <p:sp>
         <p:nvSpPr>
-          <p:cNvPr id="197" name="Google Shape;197;g1633e0d46eb_0_94"/>
+          <p:cNvPr id="7" name="TextBox 6">
+            <a:extLst>
+              <a:ext uri="{FF2B5EF4-FFF2-40B4-BE49-F238E27FC236}">
+                <a16:creationId xmlns:a16="http://schemas.microsoft.com/office/drawing/2014/main" id="{8B7B016A-EFA6-8050-F5E9-814E1B80C795}"/>
+              </a:ext>
+            </a:extLst>
+          </p:cNvPr>
           <p:cNvSpPr txBox="1"/>
           <p:nvPr/>
         </p:nvSpPr>
         <p:spPr>
           <a:xfrm>
             <a:off x="111760" y="6604000"/>
-            <a:ext cx="12080100" cy="246300"/>
+            <a:ext cx="12080240" cy="246221"/>
           </a:xfrm>
           <a:prstGeom prst="rect">
             <a:avLst/>
           </a:prstGeom>
           <a:noFill/>
-          <a:ln>
-            <a:noFill/>
-          </a:ln>
         </p:spPr>
         <p:txBody>
-          <a:bodyPr spcFirstLastPara="1" wrap="square" lIns="91425" tIns="45700" rIns="91425" bIns="45700" anchor="t" anchorCtr="0">
+          <a:bodyPr wrap="square" rtlCol="0">
             <a:spAutoFit/>
           </a:bodyPr>
           <a:lstStyle/>
           <a:p>
-            <a:pPr marL="0" marR="0" lvl="0" indent="0" algn="l" rtl="0">
-              <a:spcBef>
-                <a:spcPts val="0"/>
-              </a:spcBef>
-              <a:spcAft>
-                <a:spcPts val="0"/>
-              </a:spcAft>
-              <a:buNone/>
-            </a:pPr>
             <a:r>
-              <a:rPr lang="en-US" sz="1000">
+              <a:rPr lang="en-US" sz="1000" dirty="0">
                 <a:solidFill>
-                  <a:schemeClr val="lt1"/>
+                  <a:schemeClr val="bg1"/>
                 </a:solidFill>
-                <a:latin typeface="Calibri"/>
-                <a:ea typeface="Calibri"/>
-                <a:cs typeface="Calibri"/>
-                <a:sym typeface="Calibri"/>
+                <a:latin typeface="Calibri" panose="020F0502020204030204" pitchFamily="34" charset="0"/>
+                <a:cs typeface="Calibri" panose="020F0502020204030204" pitchFamily="34" charset="0"/>
               </a:rPr>
-              <a:t>Tamojit Maiti                                                                                                                                                                                                                                                                                                                                                                 9th October 2022</a:t>
+              <a:t>Tamojit Maiti                                                                                                                                                                                                                                                                                                                                                                  8</a:t>
             </a:r>
-            <a:endParaRPr/>
-          </a:p>
-        </p:txBody>
-      </p:sp>
-      <p:sp>
-        <p:nvSpPr>
-          <p:cNvPr id="198" name="Google Shape;198;g1633e0d46eb_0_94"/>
-          <p:cNvSpPr txBox="1">
-            <a:spLocks noGrp="1"/>
-          </p:cNvSpPr>
-          <p:nvPr>
-            <p:ph type="body" idx="1"/>
-          </p:nvPr>
-        </p:nvSpPr>
-        <p:spPr>
-          <a:xfrm>
-            <a:off x="514600" y="958350"/>
-            <a:ext cx="11272200" cy="5243400"/>
-          </a:xfrm>
-          <a:prstGeom prst="rect">
-            <a:avLst/>
-          </a:prstGeom>
-        </p:spPr>
-        <p:txBody>
-          <a:bodyPr spcFirstLastPara="1" wrap="square" lIns="91425" tIns="45700" rIns="91425" bIns="45700" anchor="t" anchorCtr="0">
-            <a:noAutofit/>
-          </a:bodyPr>
-          <a:lstStyle/>
-          <a:p>
-            <a:pPr marL="419100" marR="38100">
-              <a:lnSpc>
-                <a:spcPct val="160000"/>
-              </a:lnSpc>
-              <a:spcBef>
-                <a:spcPts val="600"/>
-              </a:spcBef>
-              <a:buSzPts val="1100"/>
-            </a:pPr>
             <a:r>
-              <a:rPr lang="en-US" sz="2400" dirty="0">
+              <a:rPr lang="en-US" sz="1000" baseline="30000" dirty="0">
                 <a:solidFill>
-                  <a:srgbClr val="212121"/>
+                  <a:schemeClr val="bg1"/>
                 </a:solidFill>
+                <a:latin typeface="Calibri" panose="020F0502020204030204" pitchFamily="34" charset="0"/>
+                <a:cs typeface="Calibri" panose="020F0502020204030204" pitchFamily="34" charset="0"/>
               </a:rPr>
-              <a:t>Advantages</a:t>
+              <a:t>th</a:t>
             </a:r>
-            <a:endParaRPr sz="2400" dirty="0">
-              <a:solidFill>
-                <a:srgbClr val="212121"/>
-              </a:solidFill>
-            </a:endParaRPr>
-          </a:p>
-          <a:p>
-            <a:pPr marL="876300" marR="38100" lvl="1">
-              <a:lnSpc>
-                <a:spcPct val="160000"/>
-              </a:lnSpc>
-              <a:spcBef>
-                <a:spcPts val="600"/>
-              </a:spcBef>
-              <a:buSzPts val="1100"/>
-            </a:pPr>
             <a:r>
-              <a:rPr lang="en-US" dirty="0">
+              <a:rPr lang="en-US" sz="1000" dirty="0">
                 <a:solidFill>
-                  <a:srgbClr val="212121"/>
+                  <a:schemeClr val="bg1"/>
                 </a:solidFill>
+                <a:latin typeface="Calibri" panose="020F0502020204030204" pitchFamily="34" charset="0"/>
+                <a:cs typeface="Calibri" panose="020F0502020204030204" pitchFamily="34" charset="0"/>
               </a:rPr>
-              <a:t>Easy to Understand</a:t>
+              <a:t> October 2022</a:t>
             </a:r>
-            <a:endParaRPr dirty="0">
-              <a:solidFill>
-                <a:srgbClr val="212121"/>
-              </a:solidFill>
-            </a:endParaRPr>
-          </a:p>
-          <a:p>
-            <a:pPr marL="876300" marR="38100" lvl="1">
-              <a:lnSpc>
-                <a:spcPct val="160000"/>
-              </a:lnSpc>
-              <a:spcBef>
-                <a:spcPts val="600"/>
-              </a:spcBef>
-              <a:buSzPts val="1100"/>
-            </a:pPr>
-            <a:r>
-              <a:rPr lang="en-US" dirty="0">
-                <a:solidFill>
-                  <a:srgbClr val="212121"/>
-                </a:solidFill>
-              </a:rPr>
-              <a:t>Useful in Data exploration</a:t>
-            </a:r>
-          </a:p>
-          <a:p>
-            <a:pPr marL="876300" marR="38100" lvl="1">
-              <a:lnSpc>
-                <a:spcPct val="160000"/>
-              </a:lnSpc>
-              <a:spcBef>
-                <a:spcPts val="600"/>
-              </a:spcBef>
-              <a:buSzPts val="1100"/>
-            </a:pPr>
-            <a:r>
-              <a:rPr lang="en-US" dirty="0">
-                <a:solidFill>
-                  <a:srgbClr val="212121"/>
-                </a:solidFill>
-              </a:rPr>
-              <a:t>Non Parametric Method</a:t>
-            </a:r>
-          </a:p>
-          <a:p>
-            <a:pPr marL="419100" marR="38100">
-              <a:lnSpc>
-                <a:spcPct val="160000"/>
-              </a:lnSpc>
-              <a:spcBef>
-                <a:spcPts val="600"/>
-              </a:spcBef>
-              <a:buSzPts val="1100"/>
-            </a:pPr>
-            <a:r>
-              <a:rPr lang="en-GB" sz="2400" dirty="0">
-                <a:solidFill>
-                  <a:srgbClr val="212121"/>
-                </a:solidFill>
-              </a:rPr>
-              <a:t>Disadvantages</a:t>
-            </a:r>
-          </a:p>
-          <a:p>
-            <a:pPr marL="876300" marR="38100" lvl="1">
-              <a:lnSpc>
-                <a:spcPct val="160000"/>
-              </a:lnSpc>
-              <a:spcBef>
-                <a:spcPts val="600"/>
-              </a:spcBef>
-              <a:buSzPts val="1100"/>
-            </a:pPr>
-            <a:r>
-              <a:rPr lang="en-GB" dirty="0">
-                <a:solidFill>
-                  <a:srgbClr val="212121"/>
-                </a:solidFill>
-              </a:rPr>
-              <a:t>Over fitting</a:t>
-            </a:r>
-          </a:p>
-          <a:p>
-            <a:pPr marL="76200" marR="38100" lvl="0" indent="0" algn="l" rtl="0">
-              <a:lnSpc>
-                <a:spcPct val="160000"/>
-              </a:lnSpc>
-              <a:spcBef>
-                <a:spcPts val="600"/>
-              </a:spcBef>
-              <a:spcAft>
-                <a:spcPts val="0"/>
-              </a:spcAft>
-              <a:buClr>
-                <a:schemeClr val="dk1"/>
-              </a:buClr>
-              <a:buSzPts val="1100"/>
-              <a:buFont typeface="Arial"/>
-              <a:buNone/>
-            </a:pPr>
-            <a:endParaRPr lang="en-IN" sz="1900" dirty="0">
-              <a:solidFill>
-                <a:srgbClr val="212121"/>
-              </a:solidFill>
-            </a:endParaRPr>
-          </a:p>
-          <a:p>
-            <a:pPr marL="0" lvl="0" indent="0" algn="l" rtl="0">
-              <a:lnSpc>
-                <a:spcPct val="115000"/>
-              </a:lnSpc>
-              <a:spcBef>
-                <a:spcPts val="500"/>
-              </a:spcBef>
-              <a:spcAft>
-                <a:spcPts val="0"/>
-              </a:spcAft>
-              <a:buClr>
-                <a:schemeClr val="dk1"/>
-              </a:buClr>
-              <a:buSzPts val="1100"/>
-              <a:buFont typeface="Arial"/>
-              <a:buNone/>
-            </a:pPr>
-            <a:endParaRPr sz="1200" dirty="0">
-              <a:solidFill>
-                <a:srgbClr val="212121"/>
-              </a:solidFill>
-              <a:latin typeface="Roboto"/>
-              <a:ea typeface="Roboto"/>
-              <a:cs typeface="Roboto"/>
-              <a:sym typeface="Roboto"/>
-            </a:endParaRPr>
-          </a:p>
-          <a:p>
-            <a:pPr marL="76200" marR="38100" lvl="0" indent="0" algn="l" rtl="0">
-              <a:lnSpc>
-                <a:spcPct val="160000"/>
-              </a:lnSpc>
-              <a:spcBef>
-                <a:spcPts val="600"/>
-              </a:spcBef>
-              <a:spcAft>
-                <a:spcPts val="0"/>
-              </a:spcAft>
-              <a:buClr>
-                <a:schemeClr val="dk1"/>
-              </a:buClr>
-              <a:buSzPts val="1100"/>
-              <a:buFont typeface="Arial"/>
-              <a:buNone/>
-            </a:pPr>
-            <a:endParaRPr sz="1200" dirty="0">
-              <a:solidFill>
-                <a:srgbClr val="212121"/>
-              </a:solidFill>
-              <a:latin typeface="Roboto"/>
-              <a:ea typeface="Roboto"/>
-              <a:cs typeface="Roboto"/>
-              <a:sym typeface="Roboto"/>
-            </a:endParaRPr>
-          </a:p>
-          <a:p>
-            <a:pPr marL="0" lvl="0" indent="0" algn="l" rtl="0">
-              <a:lnSpc>
-                <a:spcPct val="115714"/>
-              </a:lnSpc>
-              <a:spcBef>
-                <a:spcPts val="500"/>
-              </a:spcBef>
-              <a:spcAft>
-                <a:spcPts val="0"/>
-              </a:spcAft>
-              <a:buSzPts val="935"/>
-              <a:buNone/>
-            </a:pPr>
-            <a:endParaRPr sz="1676" dirty="0">
-              <a:highlight>
-                <a:srgbClr val="FFFFFE"/>
-              </a:highlight>
-              <a:latin typeface="Courier New"/>
-              <a:ea typeface="Courier New"/>
-              <a:cs typeface="Courier New"/>
-              <a:sym typeface="Courier New"/>
-            </a:endParaRPr>
-          </a:p>
-          <a:p>
-            <a:pPr marL="0" lvl="0" indent="0" algn="l" rtl="0">
-              <a:lnSpc>
-                <a:spcPct val="95000"/>
-              </a:lnSpc>
-              <a:spcBef>
-                <a:spcPts val="0"/>
-              </a:spcBef>
-              <a:spcAft>
-                <a:spcPts val="0"/>
-              </a:spcAft>
-              <a:buSzPts val="935"/>
-              <a:buNone/>
-            </a:pPr>
-            <a:endParaRPr sz="992" dirty="0">
-              <a:solidFill>
-                <a:srgbClr val="212121"/>
-              </a:solidFill>
-              <a:highlight>
-                <a:srgbClr val="FFFFFF"/>
-              </a:highlight>
-              <a:latin typeface="Courier New"/>
-              <a:ea typeface="Courier New"/>
-              <a:cs typeface="Courier New"/>
-              <a:sym typeface="Courier New"/>
-            </a:endParaRPr>
-          </a:p>
-          <a:p>
-            <a:pPr marL="0" marR="76200" lvl="0" indent="0" algn="l" rtl="0">
-              <a:lnSpc>
-                <a:spcPct val="115714"/>
-              </a:lnSpc>
-              <a:spcBef>
-                <a:spcPts val="800"/>
-              </a:spcBef>
-              <a:spcAft>
-                <a:spcPts val="0"/>
-              </a:spcAft>
-              <a:buSzPts val="935"/>
-              <a:buNone/>
-            </a:pPr>
-            <a:endParaRPr sz="992" dirty="0">
-              <a:highlight>
-                <a:srgbClr val="F7F7F7"/>
-              </a:highlight>
-              <a:latin typeface="Courier New"/>
-              <a:ea typeface="Courier New"/>
-              <a:cs typeface="Courier New"/>
-              <a:sym typeface="Courier New"/>
-            </a:endParaRPr>
-          </a:p>
-          <a:p>
-            <a:pPr marL="0" marR="76200" lvl="0" indent="0" algn="l" rtl="0">
-              <a:lnSpc>
-                <a:spcPct val="115714"/>
-              </a:lnSpc>
-              <a:spcBef>
-                <a:spcPts val="800"/>
-              </a:spcBef>
-              <a:spcAft>
-                <a:spcPts val="0"/>
-              </a:spcAft>
-              <a:buSzPts val="935"/>
-              <a:buNone/>
-            </a:pPr>
-            <a:endParaRPr sz="992" dirty="0">
-              <a:highlight>
-                <a:srgbClr val="F7F7F7"/>
-              </a:highlight>
-              <a:latin typeface="Courier New"/>
-              <a:ea typeface="Courier New"/>
-              <a:cs typeface="Courier New"/>
-              <a:sym typeface="Courier New"/>
-            </a:endParaRPr>
-          </a:p>
-          <a:p>
-            <a:pPr marL="0" lvl="0" indent="0" algn="l" rtl="0">
-              <a:lnSpc>
-                <a:spcPct val="70000"/>
-              </a:lnSpc>
-              <a:spcBef>
-                <a:spcPts val="1000"/>
-              </a:spcBef>
-              <a:spcAft>
-                <a:spcPts val="0"/>
-              </a:spcAft>
-              <a:buClr>
-                <a:schemeClr val="dk1"/>
-              </a:buClr>
-              <a:buSzPts val="935"/>
-              <a:buFont typeface="Arial"/>
-              <a:buNone/>
-            </a:pPr>
-            <a:endParaRPr sz="2480" dirty="0"/>
-          </a:p>
-          <a:p>
-            <a:pPr marL="0" lvl="0" indent="0" algn="l" rtl="0">
-              <a:lnSpc>
-                <a:spcPct val="70000"/>
-              </a:lnSpc>
-              <a:spcBef>
-                <a:spcPts val="1000"/>
-              </a:spcBef>
-              <a:spcAft>
-                <a:spcPts val="0"/>
-              </a:spcAft>
-              <a:buSzPts val="935"/>
-              <a:buNone/>
-            </a:pPr>
-            <a:endParaRPr sz="2480" dirty="0"/>
           </a:p>
         </p:txBody>
       </p:sp>
     </p:spTree>
+    <p:extLst>
+      <p:ext uri="{BB962C8B-B14F-4D97-AF65-F5344CB8AC3E}">
+        <p14:creationId xmlns:p14="http://schemas.microsoft.com/office/powerpoint/2010/main" val="4080451968"/>
+      </p:ext>
+    </p:extLst>
   </p:cSld>
   <p:clrMapOvr>
     <a:masterClrMapping/>
@@ -12429,7 +12082,7 @@
 </p:sld>
 </file>
 
-<file path=ppt/slides/slide2.xml><?xml version="1.0" encoding="utf-8"?>
+<file path=ppt/slides/slide3.xml><?xml version="1.0" encoding="utf-8"?>
 <p:sld xmlns:a="http://schemas.openxmlformats.org/drawingml/2006/main" xmlns:r="http://schemas.openxmlformats.org/officeDocument/2006/relationships" xmlns:p="http://schemas.openxmlformats.org/presentationml/2006/main">
   <p:cSld>
     <p:spTree>
@@ -12534,7 +12187,7 @@
                 <a:latin typeface="Calibri" panose="020F0502020204030204" pitchFamily="34" charset="0"/>
                 <a:cs typeface="Calibri" panose="020F0502020204030204" pitchFamily="34" charset="0"/>
               </a:rPr>
-              <a:t>Agenda</a:t>
+              <a:t>What </a:t>
             </a:r>
           </a:p>
         </p:txBody>
@@ -12667,7 +12320,7 @@
         <p:spPr>
           <a:xfrm>
             <a:off x="427972" y="941294"/>
-            <a:ext cx="10784429" cy="5262979"/>
+            <a:ext cx="10784429" cy="4493538"/>
           </a:xfrm>
           <a:prstGeom prst="rect">
             <a:avLst/>
@@ -12685,38 +12338,22 @@
               <a:buChar char="•"/>
             </a:pPr>
             <a:r>
-              <a:rPr lang="en-IN" sz="2400" dirty="0">
+              <a:rPr lang="en-GB" sz="2600" dirty="0">
                 <a:latin typeface="Calibri" panose="020F0502020204030204" pitchFamily="34" charset="0"/>
                 <a:cs typeface="Calibri" panose="020F0502020204030204" pitchFamily="34" charset="0"/>
               </a:rPr>
-              <a:t>Introduction</a:t>
+              <a:t>Decision tree is a type of supervised learning algorithm that is used in classification or regression problems</a:t>
             </a:r>
           </a:p>
           <a:p>
-            <a:pPr marL="742950" lvl="1" indent="-285750">
+            <a:pPr marL="285750" indent="-285750">
               <a:buFont typeface="Arial" panose="020B0604020202020204" pitchFamily="34" charset="0"/>
               <a:buChar char="•"/>
             </a:pPr>
-            <a:r>
-              <a:rPr lang="en-IN" sz="2400" dirty="0">
-                <a:latin typeface="Calibri" panose="020F0502020204030204" pitchFamily="34" charset="0"/>
-                <a:cs typeface="Calibri" panose="020F0502020204030204" pitchFamily="34" charset="0"/>
-              </a:rPr>
-              <a:t>What</a:t>
-            </a:r>
-          </a:p>
-          <a:p>
-            <a:pPr marL="742950" lvl="1" indent="-285750">
-              <a:buFont typeface="Arial" panose="020B0604020202020204" pitchFamily="34" charset="0"/>
-              <a:buChar char="•"/>
-            </a:pPr>
-            <a:r>
-              <a:rPr lang="en-IN" sz="2400" dirty="0">
-                <a:latin typeface="Calibri" panose="020F0502020204030204" pitchFamily="34" charset="0"/>
-                <a:cs typeface="Calibri" panose="020F0502020204030204" pitchFamily="34" charset="0"/>
-              </a:rPr>
-              <a:t>Why</a:t>
-            </a:r>
+            <a:endParaRPr lang="en-GB" sz="2600" dirty="0">
+              <a:latin typeface="Calibri" panose="020F0502020204030204" pitchFamily="34" charset="0"/>
+              <a:cs typeface="Calibri" panose="020F0502020204030204" pitchFamily="34" charset="0"/>
+            </a:endParaRPr>
           </a:p>
           <a:p>
             <a:pPr marL="285750" indent="-285750">
@@ -12724,64 +12361,22 @@
               <a:buChar char="•"/>
             </a:pPr>
             <a:r>
-              <a:rPr lang="en-IN" sz="2400" dirty="0">
+              <a:rPr lang="en-GB" sz="2600" dirty="0">
                 <a:latin typeface="Calibri" panose="020F0502020204030204" pitchFamily="34" charset="0"/>
                 <a:cs typeface="Calibri" panose="020F0502020204030204" pitchFamily="34" charset="0"/>
               </a:rPr>
-              <a:t>Collaborative Filtering</a:t>
+              <a:t>It works for both categorical and continuous input and output variables</a:t>
             </a:r>
           </a:p>
           <a:p>
-            <a:pPr marL="742950" lvl="1" indent="-285750">
+            <a:pPr marL="285750" indent="-285750">
               <a:buFont typeface="Arial" panose="020B0604020202020204" pitchFamily="34" charset="0"/>
               <a:buChar char="•"/>
             </a:pPr>
-            <a:r>
-              <a:rPr lang="en-IN" sz="2400" dirty="0">
-                <a:latin typeface="Calibri" panose="020F0502020204030204" pitchFamily="34" charset="0"/>
-                <a:cs typeface="Calibri" panose="020F0502020204030204" pitchFamily="34" charset="0"/>
-              </a:rPr>
-              <a:t>Theory</a:t>
-            </a:r>
-          </a:p>
-          <a:p>
-            <a:pPr marL="1200150" lvl="2" indent="-285750">
-              <a:buFont typeface="Arial" panose="020B0604020202020204" pitchFamily="34" charset="0"/>
-              <a:buChar char="•"/>
-            </a:pPr>
-            <a:r>
-              <a:rPr lang="en-IN" sz="2400" dirty="0">
-                <a:latin typeface="Calibri" panose="020F0502020204030204" pitchFamily="34" charset="0"/>
-                <a:cs typeface="Calibri" panose="020F0502020204030204" pitchFamily="34" charset="0"/>
-              </a:rPr>
-              <a:t>User-User</a:t>
-            </a:r>
-          </a:p>
-          <a:p>
-            <a:pPr marL="1200150" lvl="2" indent="-285750">
-              <a:buFont typeface="Arial" panose="020B0604020202020204" pitchFamily="34" charset="0"/>
-              <a:buChar char="•"/>
-            </a:pPr>
-            <a:r>
-              <a:rPr lang="en-IN" sz="2400" dirty="0">
-                <a:latin typeface="Calibri" panose="020F0502020204030204" pitchFamily="34" charset="0"/>
-                <a:cs typeface="Calibri" panose="020F0502020204030204" pitchFamily="34" charset="0"/>
-              </a:rPr>
-              <a:t>Item-Item</a:t>
-            </a:r>
-          </a:p>
-          <a:p>
-            <a:pPr marL="742950" lvl="1" indent="-285750">
-              <a:buFont typeface="Arial" panose="020B0604020202020204" pitchFamily="34" charset="0"/>
-              <a:buChar char="•"/>
-            </a:pPr>
-            <a:r>
-              <a:rPr lang="en-IN" sz="2400" dirty="0">
-                <a:latin typeface="Calibri" panose="020F0502020204030204" pitchFamily="34" charset="0"/>
-                <a:cs typeface="Calibri" panose="020F0502020204030204" pitchFamily="34" charset="0"/>
-              </a:rPr>
-              <a:t>Drawbacks</a:t>
-            </a:r>
+            <a:endParaRPr lang="en-GB" sz="2600" dirty="0">
+              <a:latin typeface="Calibri" panose="020F0502020204030204" pitchFamily="34" charset="0"/>
+              <a:cs typeface="Calibri" panose="020F0502020204030204" pitchFamily="34" charset="0"/>
+            </a:endParaRPr>
           </a:p>
           <a:p>
             <a:pPr marL="285750" indent="-285750">
@@ -12789,38 +12384,22 @@
               <a:buChar char="•"/>
             </a:pPr>
             <a:r>
-              <a:rPr lang="en-IN" sz="2400" dirty="0">
+              <a:rPr lang="en-GB" sz="2600" dirty="0">
                 <a:latin typeface="Calibri" panose="020F0502020204030204" pitchFamily="34" charset="0"/>
                 <a:cs typeface="Calibri" panose="020F0502020204030204" pitchFamily="34" charset="0"/>
               </a:rPr>
-              <a:t>Latent Factor Model</a:t>
+              <a:t>An example of non-parametric model, the number of parameters can be flexible</a:t>
             </a:r>
           </a:p>
           <a:p>
-            <a:pPr marL="742950" lvl="1" indent="-285750">
+            <a:pPr marL="285750" indent="-285750">
               <a:buFont typeface="Arial" panose="020B0604020202020204" pitchFamily="34" charset="0"/>
               <a:buChar char="•"/>
             </a:pPr>
-            <a:r>
-              <a:rPr lang="en-IN" sz="2400" dirty="0">
-                <a:latin typeface="Calibri" panose="020F0502020204030204" pitchFamily="34" charset="0"/>
-                <a:cs typeface="Calibri" panose="020F0502020204030204" pitchFamily="34" charset="0"/>
-              </a:rPr>
-              <a:t>Theory</a:t>
-            </a:r>
-          </a:p>
-          <a:p>
-            <a:pPr marL="742950" lvl="1" indent="-285750">
-              <a:buFont typeface="Arial" panose="020B0604020202020204" pitchFamily="34" charset="0"/>
-              <a:buChar char="•"/>
-            </a:pPr>
-            <a:r>
-              <a:rPr lang="en-IN" sz="2400" dirty="0">
-                <a:latin typeface="Calibri" panose="020F0502020204030204" pitchFamily="34" charset="0"/>
-                <a:cs typeface="Calibri" panose="020F0502020204030204" pitchFamily="34" charset="0"/>
-              </a:rPr>
-              <a:t>Drawbacks</a:t>
-            </a:r>
+            <a:endParaRPr lang="en-GB" sz="2600" dirty="0">
+              <a:latin typeface="Calibri" panose="020F0502020204030204" pitchFamily="34" charset="0"/>
+              <a:cs typeface="Calibri" panose="020F0502020204030204" pitchFamily="34" charset="0"/>
+            </a:endParaRPr>
           </a:p>
           <a:p>
             <a:pPr marL="285750" indent="-285750">
@@ -12828,37 +12407,48 @@
               <a:buChar char="•"/>
             </a:pPr>
             <a:r>
-              <a:rPr lang="en-IN" sz="2400" dirty="0">
+              <a:rPr lang="en-GB" sz="2600" dirty="0">
                 <a:latin typeface="Calibri" panose="020F0502020204030204" pitchFamily="34" charset="0"/>
                 <a:cs typeface="Calibri" panose="020F0502020204030204" pitchFamily="34" charset="0"/>
               </a:rPr>
-              <a:t>Content Based Filtering</a:t>
+              <a:t>Usually more interpretable for people from non-tech backgrounds</a:t>
             </a:r>
           </a:p>
           <a:p>
-            <a:pPr marL="742950" lvl="1" indent="-285750">
+            <a:pPr marL="285750" indent="-285750">
+              <a:buFont typeface="Arial" panose="020B0604020202020204" pitchFamily="34" charset="0"/>
+              <a:buChar char="•"/>
+            </a:pPr>
+            <a:endParaRPr lang="en-GB" sz="2600" dirty="0">
+              <a:latin typeface="Calibri" panose="020F0502020204030204" pitchFamily="34" charset="0"/>
+              <a:cs typeface="Calibri" panose="020F0502020204030204" pitchFamily="34" charset="0"/>
+            </a:endParaRPr>
+          </a:p>
+          <a:p>
+            <a:pPr marL="285750" indent="-285750">
               <a:buFont typeface="Arial" panose="020B0604020202020204" pitchFamily="34" charset="0"/>
               <a:buChar char="•"/>
             </a:pPr>
             <a:r>
-              <a:rPr lang="en-IN" sz="2400" dirty="0">
+              <a:rPr lang="en-GB" sz="2600" dirty="0">
                 <a:latin typeface="Calibri" panose="020F0502020204030204" pitchFamily="34" charset="0"/>
                 <a:cs typeface="Calibri" panose="020F0502020204030204" pitchFamily="34" charset="0"/>
               </a:rPr>
-              <a:t>Theory</a:t>
+              <a:t>It </a:t>
             </a:r>
-          </a:p>
-          <a:p>
-            <a:pPr marL="742950" lvl="1" indent="-285750">
-              <a:buFont typeface="Arial" panose="020B0604020202020204" pitchFamily="34" charset="0"/>
-              <a:buChar char="•"/>
-            </a:pPr>
             <a:r>
-              <a:rPr lang="en-IN" sz="2400" dirty="0">
+              <a:rPr lang="en-GB" sz="2600" dirty="0" err="1">
                 <a:latin typeface="Calibri" panose="020F0502020204030204" pitchFamily="34" charset="0"/>
                 <a:cs typeface="Calibri" panose="020F0502020204030204" pitchFamily="34" charset="0"/>
               </a:rPr>
-              <a:t>Caveats</a:t>
+              <a:t>closesly</a:t>
+            </a:r>
+            <a:r>
+              <a:rPr lang="en-GB" sz="2600" dirty="0">
+                <a:latin typeface="Calibri" panose="020F0502020204030204" pitchFamily="34" charset="0"/>
+                <a:cs typeface="Calibri" panose="020F0502020204030204" pitchFamily="34" charset="0"/>
+              </a:rPr>
+              <a:t> mimics the human decision making process for simple tasks</a:t>
             </a:r>
           </a:p>
         </p:txBody>
@@ -12866,244 +12456,7 @@
     </p:spTree>
     <p:extLst>
       <p:ext uri="{BB962C8B-B14F-4D97-AF65-F5344CB8AC3E}">
-        <p14:creationId xmlns:p14="http://schemas.microsoft.com/office/powerpoint/2010/main" val="4000361069"/>
-      </p:ext>
-    </p:extLst>
-  </p:cSld>
-  <p:clrMapOvr>
-    <a:masterClrMapping/>
-  </p:clrMapOvr>
-</p:sld>
-</file>
-
-<file path=ppt/slides/slide3.xml><?xml version="1.0" encoding="utf-8"?>
-<p:sld xmlns:a="http://schemas.openxmlformats.org/drawingml/2006/main" xmlns:r="http://schemas.openxmlformats.org/officeDocument/2006/relationships" xmlns:p="http://schemas.openxmlformats.org/presentationml/2006/main">
-  <p:cSld>
-    <p:spTree>
-      <p:nvGrpSpPr>
-        <p:cNvPr id="1" name=""/>
-        <p:cNvGrpSpPr/>
-        <p:nvPr/>
-      </p:nvGrpSpPr>
-      <p:grpSpPr>
-        <a:xfrm>
-          <a:off x="0" y="0"/>
-          <a:ext cx="0" cy="0"/>
-          <a:chOff x="0" y="0"/>
-          <a:chExt cx="0" cy="0"/>
-        </a:xfrm>
-      </p:grpSpPr>
-      <p:sp>
-        <p:nvSpPr>
-          <p:cNvPr id="4" name="Rectangle 3">
-            <a:extLst>
-              <a:ext uri="{FF2B5EF4-FFF2-40B4-BE49-F238E27FC236}">
-                <a16:creationId xmlns:a16="http://schemas.microsoft.com/office/drawing/2014/main" id="{89A20CDD-996E-91BF-B8A6-1A31751E99D0}"/>
-              </a:ext>
-            </a:extLst>
-          </p:cNvPr>
-          <p:cNvSpPr/>
-          <p:nvPr/>
-        </p:nvSpPr>
-        <p:spPr>
-          <a:xfrm>
-            <a:off x="0" y="0"/>
-            <a:ext cx="12192000" cy="2612571"/>
-          </a:xfrm>
-          <a:prstGeom prst="rect">
-            <a:avLst/>
-          </a:prstGeom>
-          <a:solidFill>
-            <a:srgbClr val="FF0000"/>
-          </a:solidFill>
-          <a:ln>
-            <a:noFill/>
-          </a:ln>
-        </p:spPr>
-        <p:style>
-          <a:lnRef idx="2">
-            <a:schemeClr val="accent1">
-              <a:shade val="50000"/>
-            </a:schemeClr>
-          </a:lnRef>
-          <a:fillRef idx="1">
-            <a:schemeClr val="accent1"/>
-          </a:fillRef>
-          <a:effectRef idx="0">
-            <a:schemeClr val="accent1"/>
-          </a:effectRef>
-          <a:fontRef idx="minor">
-            <a:schemeClr val="lt1"/>
-          </a:fontRef>
-        </p:style>
-        <p:txBody>
-          <a:bodyPr rtlCol="0" anchor="ctr"/>
-          <a:lstStyle/>
-          <a:p>
-            <a:pPr algn="ctr"/>
-            <a:endParaRPr lang="en-US"/>
-          </a:p>
-        </p:txBody>
-      </p:sp>
-      <p:sp>
-        <p:nvSpPr>
-          <p:cNvPr id="5" name="TextBox 4">
-            <a:extLst>
-              <a:ext uri="{FF2B5EF4-FFF2-40B4-BE49-F238E27FC236}">
-                <a16:creationId xmlns:a16="http://schemas.microsoft.com/office/drawing/2014/main" id="{DAC887E5-C0CA-AD92-E3B2-5AD3F64ACA7E}"/>
-              </a:ext>
-            </a:extLst>
-          </p:cNvPr>
-          <p:cNvSpPr txBox="1"/>
-          <p:nvPr/>
-        </p:nvSpPr>
-        <p:spPr>
-          <a:xfrm>
-            <a:off x="32657" y="957886"/>
-            <a:ext cx="12115800" cy="1015663"/>
-          </a:xfrm>
-          <a:prstGeom prst="rect">
-            <a:avLst/>
-          </a:prstGeom>
-          <a:noFill/>
-        </p:spPr>
-        <p:txBody>
-          <a:bodyPr wrap="square" rtlCol="0">
-            <a:spAutoFit/>
-          </a:bodyPr>
-          <a:lstStyle/>
-          <a:p>
-            <a:pPr algn="ctr"/>
-            <a:r>
-              <a:rPr lang="en-US" sz="6000" dirty="0">
-                <a:solidFill>
-                  <a:schemeClr val="bg1"/>
-                </a:solidFill>
-                <a:latin typeface="Calibri" panose="020F0502020204030204" pitchFamily="34" charset="0"/>
-                <a:cs typeface="Calibri" panose="020F0502020204030204" pitchFamily="34" charset="0"/>
-              </a:rPr>
-              <a:t>Introduction to Decision Trees</a:t>
-            </a:r>
-          </a:p>
-        </p:txBody>
-      </p:sp>
-      <p:sp>
-        <p:nvSpPr>
-          <p:cNvPr id="6" name="Rectangle 5">
-            <a:extLst>
-              <a:ext uri="{FF2B5EF4-FFF2-40B4-BE49-F238E27FC236}">
-                <a16:creationId xmlns:a16="http://schemas.microsoft.com/office/drawing/2014/main" id="{EA5A31A4-0B5E-F927-F661-B75E5F783AD1}"/>
-              </a:ext>
-            </a:extLst>
-          </p:cNvPr>
-          <p:cNvSpPr/>
-          <p:nvPr/>
-        </p:nvSpPr>
-        <p:spPr>
-          <a:xfrm>
-            <a:off x="0" y="6604000"/>
-            <a:ext cx="12192000" cy="254000"/>
-          </a:xfrm>
-          <a:prstGeom prst="rect">
-            <a:avLst/>
-          </a:prstGeom>
-          <a:solidFill>
-            <a:srgbClr val="FF0000"/>
-          </a:solidFill>
-          <a:ln>
-            <a:noFill/>
-          </a:ln>
-        </p:spPr>
-        <p:style>
-          <a:lnRef idx="2">
-            <a:schemeClr val="accent1">
-              <a:shade val="50000"/>
-            </a:schemeClr>
-          </a:lnRef>
-          <a:fillRef idx="1">
-            <a:schemeClr val="accent1"/>
-          </a:fillRef>
-          <a:effectRef idx="0">
-            <a:schemeClr val="accent1"/>
-          </a:effectRef>
-          <a:fontRef idx="minor">
-            <a:schemeClr val="lt1"/>
-          </a:fontRef>
-        </p:style>
-        <p:txBody>
-          <a:bodyPr rtlCol="0" anchor="ctr"/>
-          <a:lstStyle/>
-          <a:p>
-            <a:pPr algn="ctr"/>
-            <a:endParaRPr lang="en-US"/>
-          </a:p>
-        </p:txBody>
-      </p:sp>
-      <p:sp>
-        <p:nvSpPr>
-          <p:cNvPr id="7" name="TextBox 6">
-            <a:extLst>
-              <a:ext uri="{FF2B5EF4-FFF2-40B4-BE49-F238E27FC236}">
-                <a16:creationId xmlns:a16="http://schemas.microsoft.com/office/drawing/2014/main" id="{8B7B016A-EFA6-8050-F5E9-814E1B80C795}"/>
-              </a:ext>
-            </a:extLst>
-          </p:cNvPr>
-          <p:cNvSpPr txBox="1"/>
-          <p:nvPr/>
-        </p:nvSpPr>
-        <p:spPr>
-          <a:xfrm>
-            <a:off x="111760" y="6604000"/>
-            <a:ext cx="12080240" cy="246221"/>
-          </a:xfrm>
-          <a:prstGeom prst="rect">
-            <a:avLst/>
-          </a:prstGeom>
-          <a:noFill/>
-        </p:spPr>
-        <p:txBody>
-          <a:bodyPr wrap="square" rtlCol="0">
-            <a:spAutoFit/>
-          </a:bodyPr>
-          <a:lstStyle/>
-          <a:p>
-            <a:r>
-              <a:rPr lang="en-US" sz="1000" dirty="0">
-                <a:solidFill>
-                  <a:schemeClr val="bg1"/>
-                </a:solidFill>
-                <a:latin typeface="Calibri" panose="020F0502020204030204" pitchFamily="34" charset="0"/>
-                <a:cs typeface="Calibri" panose="020F0502020204030204" pitchFamily="34" charset="0"/>
-              </a:rPr>
-              <a:t>Tamojit Maiti                                                                                                                                                                                                                                                                                                                                                                  8</a:t>
-            </a:r>
-            <a:r>
-              <a:rPr lang="en-US" sz="1000" baseline="30000" dirty="0">
-                <a:solidFill>
-                  <a:schemeClr val="bg1"/>
-                </a:solidFill>
-                <a:latin typeface="Calibri" panose="020F0502020204030204" pitchFamily="34" charset="0"/>
-                <a:cs typeface="Calibri" panose="020F0502020204030204" pitchFamily="34" charset="0"/>
-              </a:rPr>
-              <a:t>th</a:t>
-            </a:r>
-            <a:r>
-              <a:rPr lang="en-US" sz="1000" dirty="0">
-                <a:solidFill>
-                  <a:schemeClr val="bg1"/>
-                </a:solidFill>
-                <a:latin typeface="Calibri" panose="020F0502020204030204" pitchFamily="34" charset="0"/>
-                <a:cs typeface="Calibri" panose="020F0502020204030204" pitchFamily="34" charset="0"/>
-              </a:rPr>
-              <a:t> October 2022</a:t>
-            </a:r>
-          </a:p>
-        </p:txBody>
-      </p:sp>
-    </p:spTree>
-    <p:extLst>
-      <p:ext uri="{BB962C8B-B14F-4D97-AF65-F5344CB8AC3E}">
-        <p14:creationId xmlns:p14="http://schemas.microsoft.com/office/powerpoint/2010/main" val="4080451968"/>
+        <p14:creationId xmlns:p14="http://schemas.microsoft.com/office/powerpoint/2010/main" val="432706125"/>
       </p:ext>
     </p:extLst>
   </p:cSld>
@@ -13218,7 +12571,7 @@
                 <a:latin typeface="Calibri" panose="020F0502020204030204" pitchFamily="34" charset="0"/>
                 <a:cs typeface="Calibri" panose="020F0502020204030204" pitchFamily="34" charset="0"/>
               </a:rPr>
-              <a:t>What </a:t>
+              <a:t>Example</a:t>
             </a:r>
           </a:p>
         </p:txBody>
@@ -13350,390 +12703,6 @@
         </p:nvSpPr>
         <p:spPr>
           <a:xfrm>
-            <a:off x="427972" y="941294"/>
-            <a:ext cx="10784429" cy="4493538"/>
-          </a:xfrm>
-          <a:prstGeom prst="rect">
-            <a:avLst/>
-          </a:prstGeom>
-          <a:noFill/>
-        </p:spPr>
-        <p:txBody>
-          <a:bodyPr wrap="square" rtlCol="0">
-            <a:spAutoFit/>
-          </a:bodyPr>
-          <a:lstStyle/>
-          <a:p>
-            <a:pPr marL="285750" indent="-285750">
-              <a:buFont typeface="Arial" panose="020B0604020202020204" pitchFamily="34" charset="0"/>
-              <a:buChar char="•"/>
-            </a:pPr>
-            <a:r>
-              <a:rPr lang="en-GB" sz="2600" dirty="0">
-                <a:latin typeface="Calibri" panose="020F0502020204030204" pitchFamily="34" charset="0"/>
-                <a:cs typeface="Calibri" panose="020F0502020204030204" pitchFamily="34" charset="0"/>
-              </a:rPr>
-              <a:t>Decision tree is a type of supervised learning algorithm that is used in classification or regression problems</a:t>
-            </a:r>
-          </a:p>
-          <a:p>
-            <a:pPr marL="285750" indent="-285750">
-              <a:buFont typeface="Arial" panose="020B0604020202020204" pitchFamily="34" charset="0"/>
-              <a:buChar char="•"/>
-            </a:pPr>
-            <a:endParaRPr lang="en-GB" sz="2600" dirty="0">
-              <a:latin typeface="Calibri" panose="020F0502020204030204" pitchFamily="34" charset="0"/>
-              <a:cs typeface="Calibri" panose="020F0502020204030204" pitchFamily="34" charset="0"/>
-            </a:endParaRPr>
-          </a:p>
-          <a:p>
-            <a:pPr marL="285750" indent="-285750">
-              <a:buFont typeface="Arial" panose="020B0604020202020204" pitchFamily="34" charset="0"/>
-              <a:buChar char="•"/>
-            </a:pPr>
-            <a:r>
-              <a:rPr lang="en-GB" sz="2600" dirty="0">
-                <a:latin typeface="Calibri" panose="020F0502020204030204" pitchFamily="34" charset="0"/>
-                <a:cs typeface="Calibri" panose="020F0502020204030204" pitchFamily="34" charset="0"/>
-              </a:rPr>
-              <a:t>It works for both categorical and continuous input and output variables</a:t>
-            </a:r>
-          </a:p>
-          <a:p>
-            <a:pPr marL="285750" indent="-285750">
-              <a:buFont typeface="Arial" panose="020B0604020202020204" pitchFamily="34" charset="0"/>
-              <a:buChar char="•"/>
-            </a:pPr>
-            <a:endParaRPr lang="en-GB" sz="2600" dirty="0">
-              <a:latin typeface="Calibri" panose="020F0502020204030204" pitchFamily="34" charset="0"/>
-              <a:cs typeface="Calibri" panose="020F0502020204030204" pitchFamily="34" charset="0"/>
-            </a:endParaRPr>
-          </a:p>
-          <a:p>
-            <a:pPr marL="285750" indent="-285750">
-              <a:buFont typeface="Arial" panose="020B0604020202020204" pitchFamily="34" charset="0"/>
-              <a:buChar char="•"/>
-            </a:pPr>
-            <a:r>
-              <a:rPr lang="en-GB" sz="2600" dirty="0">
-                <a:latin typeface="Calibri" panose="020F0502020204030204" pitchFamily="34" charset="0"/>
-                <a:cs typeface="Calibri" panose="020F0502020204030204" pitchFamily="34" charset="0"/>
-              </a:rPr>
-              <a:t>An example of non-parametric model, the number of parameters can be flexible</a:t>
-            </a:r>
-          </a:p>
-          <a:p>
-            <a:pPr marL="285750" indent="-285750">
-              <a:buFont typeface="Arial" panose="020B0604020202020204" pitchFamily="34" charset="0"/>
-              <a:buChar char="•"/>
-            </a:pPr>
-            <a:endParaRPr lang="en-GB" sz="2600" dirty="0">
-              <a:latin typeface="Calibri" panose="020F0502020204030204" pitchFamily="34" charset="0"/>
-              <a:cs typeface="Calibri" panose="020F0502020204030204" pitchFamily="34" charset="0"/>
-            </a:endParaRPr>
-          </a:p>
-          <a:p>
-            <a:pPr marL="285750" indent="-285750">
-              <a:buFont typeface="Arial" panose="020B0604020202020204" pitchFamily="34" charset="0"/>
-              <a:buChar char="•"/>
-            </a:pPr>
-            <a:r>
-              <a:rPr lang="en-GB" sz="2600" dirty="0">
-                <a:latin typeface="Calibri" panose="020F0502020204030204" pitchFamily="34" charset="0"/>
-                <a:cs typeface="Calibri" panose="020F0502020204030204" pitchFamily="34" charset="0"/>
-              </a:rPr>
-              <a:t>Usually more interpretable for people from non-tech backgrounds</a:t>
-            </a:r>
-          </a:p>
-          <a:p>
-            <a:pPr marL="285750" indent="-285750">
-              <a:buFont typeface="Arial" panose="020B0604020202020204" pitchFamily="34" charset="0"/>
-              <a:buChar char="•"/>
-            </a:pPr>
-            <a:endParaRPr lang="en-GB" sz="2600" dirty="0">
-              <a:latin typeface="Calibri" panose="020F0502020204030204" pitchFamily="34" charset="0"/>
-              <a:cs typeface="Calibri" panose="020F0502020204030204" pitchFamily="34" charset="0"/>
-            </a:endParaRPr>
-          </a:p>
-          <a:p>
-            <a:pPr marL="285750" indent="-285750">
-              <a:buFont typeface="Arial" panose="020B0604020202020204" pitchFamily="34" charset="0"/>
-              <a:buChar char="•"/>
-            </a:pPr>
-            <a:r>
-              <a:rPr lang="en-GB" sz="2600" dirty="0">
-                <a:latin typeface="Calibri" panose="020F0502020204030204" pitchFamily="34" charset="0"/>
-                <a:cs typeface="Calibri" panose="020F0502020204030204" pitchFamily="34" charset="0"/>
-              </a:rPr>
-              <a:t>It </a:t>
-            </a:r>
-            <a:r>
-              <a:rPr lang="en-GB" sz="2600" dirty="0" err="1">
-                <a:latin typeface="Calibri" panose="020F0502020204030204" pitchFamily="34" charset="0"/>
-                <a:cs typeface="Calibri" panose="020F0502020204030204" pitchFamily="34" charset="0"/>
-              </a:rPr>
-              <a:t>closesly</a:t>
-            </a:r>
-            <a:r>
-              <a:rPr lang="en-GB" sz="2600" dirty="0">
-                <a:latin typeface="Calibri" panose="020F0502020204030204" pitchFamily="34" charset="0"/>
-                <a:cs typeface="Calibri" panose="020F0502020204030204" pitchFamily="34" charset="0"/>
-              </a:rPr>
-              <a:t> mimics the human decision making process for simple tasks</a:t>
-            </a:r>
-          </a:p>
-        </p:txBody>
-      </p:sp>
-    </p:spTree>
-    <p:extLst>
-      <p:ext uri="{BB962C8B-B14F-4D97-AF65-F5344CB8AC3E}">
-        <p14:creationId xmlns:p14="http://schemas.microsoft.com/office/powerpoint/2010/main" val="432706125"/>
-      </p:ext>
-    </p:extLst>
-  </p:cSld>
-  <p:clrMapOvr>
-    <a:masterClrMapping/>
-  </p:clrMapOvr>
-</p:sld>
-</file>
-
-<file path=ppt/slides/slide5.xml><?xml version="1.0" encoding="utf-8"?>
-<p:sld xmlns:a="http://schemas.openxmlformats.org/drawingml/2006/main" xmlns:r="http://schemas.openxmlformats.org/officeDocument/2006/relationships" xmlns:p="http://schemas.openxmlformats.org/presentationml/2006/main">
-  <p:cSld>
-    <p:spTree>
-      <p:nvGrpSpPr>
-        <p:cNvPr id="1" name=""/>
-        <p:cNvGrpSpPr/>
-        <p:nvPr/>
-      </p:nvGrpSpPr>
-      <p:grpSpPr>
-        <a:xfrm>
-          <a:off x="0" y="0"/>
-          <a:ext cx="0" cy="0"/>
-          <a:chOff x="0" y="0"/>
-          <a:chExt cx="0" cy="0"/>
-        </a:xfrm>
-      </p:grpSpPr>
-      <p:sp>
-        <p:nvSpPr>
-          <p:cNvPr id="4" name="Rectangle 3">
-            <a:extLst>
-              <a:ext uri="{FF2B5EF4-FFF2-40B4-BE49-F238E27FC236}">
-                <a16:creationId xmlns:a16="http://schemas.microsoft.com/office/drawing/2014/main" id="{89A20CDD-996E-91BF-B8A6-1A31751E99D0}"/>
-              </a:ext>
-            </a:extLst>
-          </p:cNvPr>
-          <p:cNvSpPr/>
-          <p:nvPr/>
-        </p:nvSpPr>
-        <p:spPr>
-          <a:xfrm>
-            <a:off x="0" y="0"/>
-            <a:ext cx="12192000" cy="689818"/>
-          </a:xfrm>
-          <a:prstGeom prst="rect">
-            <a:avLst/>
-          </a:prstGeom>
-          <a:solidFill>
-            <a:srgbClr val="FF0000"/>
-          </a:solidFill>
-          <a:ln>
-            <a:noFill/>
-          </a:ln>
-        </p:spPr>
-        <p:style>
-          <a:lnRef idx="2">
-            <a:schemeClr val="accent1">
-              <a:shade val="50000"/>
-            </a:schemeClr>
-          </a:lnRef>
-          <a:fillRef idx="1">
-            <a:schemeClr val="accent1"/>
-          </a:fillRef>
-          <a:effectRef idx="0">
-            <a:schemeClr val="accent1"/>
-          </a:effectRef>
-          <a:fontRef idx="minor">
-            <a:schemeClr val="lt1"/>
-          </a:fontRef>
-        </p:style>
-        <p:txBody>
-          <a:bodyPr rtlCol="0" anchor="ctr"/>
-          <a:lstStyle/>
-          <a:p>
-            <a:pPr algn="ctr"/>
-            <a:endParaRPr lang="en-US"/>
-          </a:p>
-        </p:txBody>
-      </p:sp>
-      <p:sp>
-        <p:nvSpPr>
-          <p:cNvPr id="5" name="TextBox 4">
-            <a:extLst>
-              <a:ext uri="{FF2B5EF4-FFF2-40B4-BE49-F238E27FC236}">
-                <a16:creationId xmlns:a16="http://schemas.microsoft.com/office/drawing/2014/main" id="{DAC887E5-C0CA-AD92-E3B2-5AD3F64ACA7E}"/>
-              </a:ext>
-            </a:extLst>
-          </p:cNvPr>
-          <p:cNvSpPr txBox="1"/>
-          <p:nvPr/>
-        </p:nvSpPr>
-        <p:spPr>
-          <a:xfrm>
-            <a:off x="427973" y="21743"/>
-            <a:ext cx="5425440" cy="646331"/>
-          </a:xfrm>
-          <a:prstGeom prst="rect">
-            <a:avLst/>
-          </a:prstGeom>
-          <a:noFill/>
-        </p:spPr>
-        <p:txBody>
-          <a:bodyPr wrap="square" rtlCol="0">
-            <a:spAutoFit/>
-          </a:bodyPr>
-          <a:lstStyle/>
-          <a:p>
-            <a:r>
-              <a:rPr lang="en-US" sz="3600" dirty="0">
-                <a:solidFill>
-                  <a:schemeClr val="bg1"/>
-                </a:solidFill>
-                <a:latin typeface="Calibri" panose="020F0502020204030204" pitchFamily="34" charset="0"/>
-                <a:cs typeface="Calibri" panose="020F0502020204030204" pitchFamily="34" charset="0"/>
-              </a:rPr>
-              <a:t>Example</a:t>
-            </a:r>
-          </a:p>
-        </p:txBody>
-      </p:sp>
-      <p:sp>
-        <p:nvSpPr>
-          <p:cNvPr id="6" name="Rectangle 5">
-            <a:extLst>
-              <a:ext uri="{FF2B5EF4-FFF2-40B4-BE49-F238E27FC236}">
-                <a16:creationId xmlns:a16="http://schemas.microsoft.com/office/drawing/2014/main" id="{831665CB-52C3-3EB9-64F4-144B5683834E}"/>
-              </a:ext>
-            </a:extLst>
-          </p:cNvPr>
-          <p:cNvSpPr/>
-          <p:nvPr/>
-        </p:nvSpPr>
-        <p:spPr>
-          <a:xfrm>
-            <a:off x="0" y="6604000"/>
-            <a:ext cx="12192000" cy="254000"/>
-          </a:xfrm>
-          <a:prstGeom prst="rect">
-            <a:avLst/>
-          </a:prstGeom>
-          <a:solidFill>
-            <a:srgbClr val="FF0000"/>
-          </a:solidFill>
-          <a:ln>
-            <a:noFill/>
-          </a:ln>
-        </p:spPr>
-        <p:style>
-          <a:lnRef idx="2">
-            <a:schemeClr val="accent1">
-              <a:shade val="50000"/>
-            </a:schemeClr>
-          </a:lnRef>
-          <a:fillRef idx="1">
-            <a:schemeClr val="accent1"/>
-          </a:fillRef>
-          <a:effectRef idx="0">
-            <a:schemeClr val="accent1"/>
-          </a:effectRef>
-          <a:fontRef idx="minor">
-            <a:schemeClr val="lt1"/>
-          </a:fontRef>
-        </p:style>
-        <p:txBody>
-          <a:bodyPr rtlCol="0" anchor="ctr"/>
-          <a:lstStyle/>
-          <a:p>
-            <a:pPr algn="ctr"/>
-            <a:endParaRPr lang="en-US"/>
-          </a:p>
-        </p:txBody>
-      </p:sp>
-      <p:sp>
-        <p:nvSpPr>
-          <p:cNvPr id="7" name="TextBox 6">
-            <a:extLst>
-              <a:ext uri="{FF2B5EF4-FFF2-40B4-BE49-F238E27FC236}">
-                <a16:creationId xmlns:a16="http://schemas.microsoft.com/office/drawing/2014/main" id="{0DC22945-4836-8BCD-4D7E-D07CF3BA6DFD}"/>
-              </a:ext>
-            </a:extLst>
-          </p:cNvPr>
-          <p:cNvSpPr txBox="1"/>
-          <p:nvPr/>
-        </p:nvSpPr>
-        <p:spPr>
-          <a:xfrm>
-            <a:off x="0" y="6604000"/>
-            <a:ext cx="12192000" cy="246221"/>
-          </a:xfrm>
-          <a:prstGeom prst="rect">
-            <a:avLst/>
-          </a:prstGeom>
-          <a:noFill/>
-        </p:spPr>
-        <p:txBody>
-          <a:bodyPr wrap="square" rtlCol="0">
-            <a:spAutoFit/>
-          </a:bodyPr>
-          <a:lstStyle/>
-          <a:p>
-            <a:r>
-              <a:rPr lang="en-US" sz="1000" dirty="0">
-                <a:solidFill>
-                  <a:schemeClr val="bg1"/>
-                </a:solidFill>
-                <a:latin typeface="Calibri" panose="020F0502020204030204" pitchFamily="34" charset="0"/>
-                <a:cs typeface="Calibri" panose="020F0502020204030204" pitchFamily="34" charset="0"/>
-              </a:rPr>
-              <a:t>Tamojit Maiti                                                                                                                                                                                                                                                                                                                                                         8</a:t>
-            </a:r>
-            <a:r>
-              <a:rPr lang="en-US" sz="1000" baseline="30000" dirty="0">
-                <a:solidFill>
-                  <a:schemeClr val="bg1"/>
-                </a:solidFill>
-                <a:latin typeface="Calibri" panose="020F0502020204030204" pitchFamily="34" charset="0"/>
-                <a:cs typeface="Calibri" panose="020F0502020204030204" pitchFamily="34" charset="0"/>
-              </a:rPr>
-              <a:t>th</a:t>
-            </a:r>
-            <a:r>
-              <a:rPr lang="en-US" sz="1000" dirty="0">
-                <a:solidFill>
-                  <a:schemeClr val="bg1"/>
-                </a:solidFill>
-                <a:latin typeface="Calibri" panose="020F0502020204030204" pitchFamily="34" charset="0"/>
-                <a:cs typeface="Calibri" panose="020F0502020204030204" pitchFamily="34" charset="0"/>
-              </a:rPr>
-              <a:t> October 2022</a:t>
-            </a:r>
-          </a:p>
-        </p:txBody>
-      </p:sp>
-      <p:sp>
-        <p:nvSpPr>
-          <p:cNvPr id="2" name="TextBox 1">
-            <a:extLst>
-              <a:ext uri="{FF2B5EF4-FFF2-40B4-BE49-F238E27FC236}">
-                <a16:creationId xmlns:a16="http://schemas.microsoft.com/office/drawing/2014/main" id="{703F18F7-1026-12A9-C26A-5A1D55DE2700}"/>
-              </a:ext>
-            </a:extLst>
-          </p:cNvPr>
-          <p:cNvSpPr txBox="1"/>
-          <p:nvPr/>
-        </p:nvSpPr>
-        <p:spPr>
-          <a:xfrm>
             <a:off x="427973" y="941294"/>
             <a:ext cx="9901016" cy="4893647"/>
           </a:xfrm>
@@ -13821,7 +12790,7 @@
 </p:sld>
 </file>
 
-<file path=ppt/slides/slide6.xml><?xml version="1.0" encoding="utf-8"?>
+<file path=ppt/slides/slide5.xml><?xml version="1.0" encoding="utf-8"?>
 <p:sld xmlns:a="http://schemas.openxmlformats.org/drawingml/2006/main" xmlns:r="http://schemas.openxmlformats.org/officeDocument/2006/relationships" xmlns:p="http://schemas.openxmlformats.org/presentationml/2006/main">
   <p:cSld>
     <p:spTree>
@@ -14269,7 +13238,7 @@
 </p:sld>
 </file>
 
-<file path=ppt/slides/slide7.xml><?xml version="1.0" encoding="utf-8"?>
+<file path=ppt/slides/slide6.xml><?xml version="1.0" encoding="utf-8"?>
 <p:sld xmlns:a="http://schemas.openxmlformats.org/drawingml/2006/main" xmlns:r="http://schemas.openxmlformats.org/officeDocument/2006/relationships" xmlns:p="http://schemas.openxmlformats.org/presentationml/2006/main">
   <p:cSld>
     <p:spTree>
@@ -14824,7 +13793,7 @@
 </p:sld>
 </file>
 
-<file path=ppt/slides/slide8.xml><?xml version="1.0" encoding="utf-8"?>
+<file path=ppt/slides/slide7.xml><?xml version="1.0" encoding="utf-8"?>
 <p:sld xmlns:a="http://schemas.openxmlformats.org/drawingml/2006/main" xmlns:r="http://schemas.openxmlformats.org/officeDocument/2006/relationships" xmlns:p="http://schemas.openxmlformats.org/presentationml/2006/main">
   <p:cSld>
     <p:spTree>
@@ -15371,7 +14340,7 @@
 </p:sld>
 </file>
 
-<file path=ppt/slides/slide9.xml><?xml version="1.0" encoding="utf-8"?>
+<file path=ppt/slides/slide8.xml><?xml version="1.0" encoding="utf-8"?>
 <p:sld xmlns:a="http://schemas.openxmlformats.org/drawingml/2006/main" xmlns:r="http://schemas.openxmlformats.org/officeDocument/2006/relationships" xmlns:p="http://schemas.openxmlformats.org/presentationml/2006/main">
   <p:cSld>
     <p:spTree>
@@ -15801,6 +14770,592 @@
               </a:rPr>
               <a:t>Example (…continued)</a:t>
             </a:r>
+          </a:p>
+        </p:txBody>
+      </p:sp>
+    </p:spTree>
+  </p:cSld>
+  <p:clrMapOvr>
+    <a:masterClrMapping/>
+  </p:clrMapOvr>
+</p:sld>
+</file>
+
+<file path=ppt/slides/slide9.xml><?xml version="1.0" encoding="utf-8"?>
+<p:sld xmlns:a="http://schemas.openxmlformats.org/drawingml/2006/main" xmlns:r="http://schemas.openxmlformats.org/officeDocument/2006/relationships" xmlns:p="http://schemas.openxmlformats.org/presentationml/2006/main">
+  <p:cSld>
+    <p:spTree>
+      <p:nvGrpSpPr>
+        <p:cNvPr id="1" name="Shape 193"/>
+        <p:cNvGrpSpPr/>
+        <p:nvPr/>
+      </p:nvGrpSpPr>
+      <p:grpSpPr>
+        <a:xfrm>
+          <a:off x="0" y="0"/>
+          <a:ext cx="0" cy="0"/>
+          <a:chOff x="0" y="0"/>
+          <a:chExt cx="0" cy="0"/>
+        </a:xfrm>
+      </p:grpSpPr>
+      <p:sp>
+        <p:nvSpPr>
+          <p:cNvPr id="194" name="Google Shape;194;g1633e0d46eb_0_94"/>
+          <p:cNvSpPr/>
+          <p:nvPr/>
+        </p:nvSpPr>
+        <p:spPr>
+          <a:xfrm>
+            <a:off x="0" y="0"/>
+            <a:ext cx="12192000" cy="721800"/>
+          </a:xfrm>
+          <a:prstGeom prst="rect">
+            <a:avLst/>
+          </a:prstGeom>
+          <a:solidFill>
+            <a:srgbClr val="FF0000"/>
+          </a:solidFill>
+          <a:ln>
+            <a:noFill/>
+          </a:ln>
+        </p:spPr>
+        <p:txBody>
+          <a:bodyPr spcFirstLastPara="1" wrap="square" lIns="91425" tIns="45700" rIns="91425" bIns="45700" anchor="ctr" anchorCtr="0">
+            <a:noAutofit/>
+          </a:bodyPr>
+          <a:lstStyle/>
+          <a:p>
+            <a:pPr marL="0" marR="0" lvl="0" indent="0" algn="ctr" rtl="0">
+              <a:spcBef>
+                <a:spcPts val="0"/>
+              </a:spcBef>
+              <a:spcAft>
+                <a:spcPts val="0"/>
+              </a:spcAft>
+              <a:buNone/>
+            </a:pPr>
+            <a:endParaRPr sz="1800">
+              <a:solidFill>
+                <a:schemeClr val="lt1"/>
+              </a:solidFill>
+              <a:latin typeface="Calibri"/>
+              <a:ea typeface="Calibri"/>
+              <a:cs typeface="Calibri"/>
+              <a:sym typeface="Calibri"/>
+            </a:endParaRPr>
+          </a:p>
+        </p:txBody>
+      </p:sp>
+      <p:sp>
+        <p:nvSpPr>
+          <p:cNvPr id="195" name="Google Shape;195;g1633e0d46eb_0_94"/>
+          <p:cNvSpPr txBox="1"/>
+          <p:nvPr/>
+        </p:nvSpPr>
+        <p:spPr>
+          <a:xfrm>
+            <a:off x="427977" y="21757"/>
+            <a:ext cx="11358900" cy="646500"/>
+          </a:xfrm>
+          <a:prstGeom prst="rect">
+            <a:avLst/>
+          </a:prstGeom>
+          <a:noFill/>
+          <a:ln>
+            <a:noFill/>
+          </a:ln>
+        </p:spPr>
+        <p:txBody>
+          <a:bodyPr spcFirstLastPara="1" wrap="square" lIns="91425" tIns="45700" rIns="91425" bIns="45700" anchor="t" anchorCtr="0">
+            <a:spAutoFit/>
+          </a:bodyPr>
+          <a:lstStyle/>
+          <a:p>
+            <a:pPr marL="0" marR="0" lvl="0" indent="0" algn="l" rtl="0">
+              <a:spcBef>
+                <a:spcPts val="0"/>
+              </a:spcBef>
+              <a:spcAft>
+                <a:spcPts val="0"/>
+              </a:spcAft>
+              <a:buNone/>
+            </a:pPr>
+            <a:r>
+              <a:rPr lang="en-US" sz="3600" dirty="0">
+                <a:solidFill>
+                  <a:schemeClr val="lt1"/>
+                </a:solidFill>
+                <a:latin typeface="Calibri"/>
+                <a:ea typeface="Calibri"/>
+                <a:cs typeface="Calibri"/>
+                <a:sym typeface="Calibri"/>
+              </a:rPr>
+              <a:t>Advantages and Disadvantages of Decision Tree</a:t>
+            </a:r>
+            <a:endParaRPr dirty="0"/>
+          </a:p>
+        </p:txBody>
+      </p:sp>
+      <p:sp>
+        <p:nvSpPr>
+          <p:cNvPr id="196" name="Google Shape;196;g1633e0d46eb_0_94"/>
+          <p:cNvSpPr/>
+          <p:nvPr/>
+        </p:nvSpPr>
+        <p:spPr>
+          <a:xfrm>
+            <a:off x="0" y="6604000"/>
+            <a:ext cx="12192000" cy="254100"/>
+          </a:xfrm>
+          <a:prstGeom prst="rect">
+            <a:avLst/>
+          </a:prstGeom>
+          <a:solidFill>
+            <a:srgbClr val="FF0000"/>
+          </a:solidFill>
+          <a:ln>
+            <a:noFill/>
+          </a:ln>
+        </p:spPr>
+        <p:txBody>
+          <a:bodyPr spcFirstLastPara="1" wrap="square" lIns="91425" tIns="45700" rIns="91425" bIns="45700" anchor="ctr" anchorCtr="0">
+            <a:noAutofit/>
+          </a:bodyPr>
+          <a:lstStyle/>
+          <a:p>
+            <a:pPr marL="0" marR="0" lvl="0" indent="0" algn="ctr" rtl="0">
+              <a:spcBef>
+                <a:spcPts val="0"/>
+              </a:spcBef>
+              <a:spcAft>
+                <a:spcPts val="0"/>
+              </a:spcAft>
+              <a:buNone/>
+            </a:pPr>
+            <a:endParaRPr sz="1800">
+              <a:solidFill>
+                <a:schemeClr val="lt1"/>
+              </a:solidFill>
+              <a:latin typeface="Calibri"/>
+              <a:ea typeface="Calibri"/>
+              <a:cs typeface="Calibri"/>
+              <a:sym typeface="Calibri"/>
+            </a:endParaRPr>
+          </a:p>
+        </p:txBody>
+      </p:sp>
+      <p:sp>
+        <p:nvSpPr>
+          <p:cNvPr id="197" name="Google Shape;197;g1633e0d46eb_0_94"/>
+          <p:cNvSpPr txBox="1"/>
+          <p:nvPr/>
+        </p:nvSpPr>
+        <p:spPr>
+          <a:xfrm>
+            <a:off x="111760" y="6604000"/>
+            <a:ext cx="12080100" cy="246300"/>
+          </a:xfrm>
+          <a:prstGeom prst="rect">
+            <a:avLst/>
+          </a:prstGeom>
+          <a:noFill/>
+          <a:ln>
+            <a:noFill/>
+          </a:ln>
+        </p:spPr>
+        <p:txBody>
+          <a:bodyPr spcFirstLastPara="1" wrap="square" lIns="91425" tIns="45700" rIns="91425" bIns="45700" anchor="t" anchorCtr="0">
+            <a:spAutoFit/>
+          </a:bodyPr>
+          <a:lstStyle/>
+          <a:p>
+            <a:pPr marL="0" marR="0" lvl="0" indent="0" algn="l" rtl="0">
+              <a:spcBef>
+                <a:spcPts val="0"/>
+              </a:spcBef>
+              <a:spcAft>
+                <a:spcPts val="0"/>
+              </a:spcAft>
+              <a:buNone/>
+            </a:pPr>
+            <a:r>
+              <a:rPr lang="en-US" sz="1000">
+                <a:solidFill>
+                  <a:schemeClr val="lt1"/>
+                </a:solidFill>
+                <a:latin typeface="Calibri"/>
+                <a:ea typeface="Calibri"/>
+                <a:cs typeface="Calibri"/>
+                <a:sym typeface="Calibri"/>
+              </a:rPr>
+              <a:t>Tamojit Maiti                                                                                                                                                                                                                                                                                                                                                                 9th October 2022</a:t>
+            </a:r>
+            <a:endParaRPr/>
+          </a:p>
+        </p:txBody>
+      </p:sp>
+      <p:sp>
+        <p:nvSpPr>
+          <p:cNvPr id="198" name="Google Shape;198;g1633e0d46eb_0_94"/>
+          <p:cNvSpPr txBox="1">
+            <a:spLocks noGrp="1"/>
+          </p:cNvSpPr>
+          <p:nvPr>
+            <p:ph type="body" idx="1"/>
+          </p:nvPr>
+        </p:nvSpPr>
+        <p:spPr>
+          <a:xfrm>
+            <a:off x="514600" y="958350"/>
+            <a:ext cx="11272200" cy="5243400"/>
+          </a:xfrm>
+          <a:prstGeom prst="rect">
+            <a:avLst/>
+          </a:prstGeom>
+        </p:spPr>
+        <p:txBody>
+          <a:bodyPr spcFirstLastPara="1" wrap="square" lIns="91425" tIns="45700" rIns="91425" bIns="45700" anchor="t" anchorCtr="0">
+            <a:noAutofit/>
+          </a:bodyPr>
+          <a:lstStyle/>
+          <a:p>
+            <a:pPr marL="419100" marR="38100">
+              <a:lnSpc>
+                <a:spcPct val="160000"/>
+              </a:lnSpc>
+              <a:spcBef>
+                <a:spcPts val="600"/>
+              </a:spcBef>
+              <a:buSzPts val="1100"/>
+            </a:pPr>
+            <a:r>
+              <a:rPr lang="en-US" sz="2400" dirty="0">
+                <a:solidFill>
+                  <a:srgbClr val="212121"/>
+                </a:solidFill>
+              </a:rPr>
+              <a:t>Advantages</a:t>
+            </a:r>
+            <a:endParaRPr sz="2400" dirty="0">
+              <a:solidFill>
+                <a:srgbClr val="212121"/>
+              </a:solidFill>
+            </a:endParaRPr>
+          </a:p>
+          <a:p>
+            <a:pPr marL="876300" marR="38100" lvl="1">
+              <a:lnSpc>
+                <a:spcPct val="160000"/>
+              </a:lnSpc>
+              <a:spcBef>
+                <a:spcPts val="600"/>
+              </a:spcBef>
+              <a:buSzPts val="1100"/>
+            </a:pPr>
+            <a:r>
+              <a:rPr lang="en-US" dirty="0">
+                <a:solidFill>
+                  <a:srgbClr val="212121"/>
+                </a:solidFill>
+              </a:rPr>
+              <a:t>Easy to Understand</a:t>
+            </a:r>
+            <a:endParaRPr dirty="0">
+              <a:solidFill>
+                <a:srgbClr val="212121"/>
+              </a:solidFill>
+            </a:endParaRPr>
+          </a:p>
+          <a:p>
+            <a:pPr marL="876300" marR="38100" lvl="1">
+              <a:lnSpc>
+                <a:spcPct val="160000"/>
+              </a:lnSpc>
+              <a:spcBef>
+                <a:spcPts val="600"/>
+              </a:spcBef>
+              <a:buSzPts val="1100"/>
+            </a:pPr>
+            <a:r>
+              <a:rPr lang="en-US" dirty="0">
+                <a:solidFill>
+                  <a:srgbClr val="212121"/>
+                </a:solidFill>
+              </a:rPr>
+              <a:t>Useful in Data exploration</a:t>
+            </a:r>
+          </a:p>
+          <a:p>
+            <a:pPr marL="876300" marR="38100" lvl="1">
+              <a:lnSpc>
+                <a:spcPct val="160000"/>
+              </a:lnSpc>
+              <a:spcBef>
+                <a:spcPts val="600"/>
+              </a:spcBef>
+              <a:buSzPts val="1100"/>
+            </a:pPr>
+            <a:r>
+              <a:rPr lang="en-US" dirty="0">
+                <a:solidFill>
+                  <a:srgbClr val="212121"/>
+                </a:solidFill>
+              </a:rPr>
+              <a:t>Non Parametric Method</a:t>
+            </a:r>
+          </a:p>
+          <a:p>
+            <a:pPr marL="419100" marR="38100">
+              <a:lnSpc>
+                <a:spcPct val="160000"/>
+              </a:lnSpc>
+              <a:spcBef>
+                <a:spcPts val="600"/>
+              </a:spcBef>
+              <a:buSzPts val="1100"/>
+            </a:pPr>
+            <a:r>
+              <a:rPr lang="en-GB" sz="2400" dirty="0">
+                <a:solidFill>
+                  <a:srgbClr val="212121"/>
+                </a:solidFill>
+              </a:rPr>
+              <a:t>Disadvantages</a:t>
+            </a:r>
+          </a:p>
+          <a:p>
+            <a:pPr marL="876300" marR="38100" lvl="1">
+              <a:lnSpc>
+                <a:spcPct val="160000"/>
+              </a:lnSpc>
+              <a:spcBef>
+                <a:spcPts val="600"/>
+              </a:spcBef>
+              <a:buSzPts val="1100"/>
+            </a:pPr>
+            <a:r>
+              <a:rPr lang="en-GB" dirty="0">
+                <a:solidFill>
+                  <a:srgbClr val="212121"/>
+                </a:solidFill>
+              </a:rPr>
+              <a:t>Over fitting</a:t>
+            </a:r>
+          </a:p>
+          <a:p>
+            <a:pPr marL="76200" marR="38100" lvl="0" indent="0" algn="l" rtl="0">
+              <a:lnSpc>
+                <a:spcPct val="160000"/>
+              </a:lnSpc>
+              <a:spcBef>
+                <a:spcPts val="600"/>
+              </a:spcBef>
+              <a:spcAft>
+                <a:spcPts val="0"/>
+              </a:spcAft>
+              <a:buClr>
+                <a:schemeClr val="dk1"/>
+              </a:buClr>
+              <a:buSzPts val="1100"/>
+              <a:buFont typeface="Arial"/>
+              <a:buNone/>
+            </a:pPr>
+            <a:endParaRPr lang="en-IN" sz="1900" dirty="0">
+              <a:solidFill>
+                <a:srgbClr val="212121"/>
+              </a:solidFill>
+            </a:endParaRPr>
+          </a:p>
+          <a:p>
+            <a:pPr marL="0" lvl="0" indent="0" algn="l" rtl="0">
+              <a:lnSpc>
+                <a:spcPct val="115000"/>
+              </a:lnSpc>
+              <a:spcBef>
+                <a:spcPts val="500"/>
+              </a:spcBef>
+              <a:spcAft>
+                <a:spcPts val="0"/>
+              </a:spcAft>
+              <a:buClr>
+                <a:schemeClr val="dk1"/>
+              </a:buClr>
+              <a:buSzPts val="1100"/>
+              <a:buFont typeface="Arial"/>
+              <a:buNone/>
+            </a:pPr>
+            <a:endParaRPr sz="1200" dirty="0">
+              <a:solidFill>
+                <a:srgbClr val="212121"/>
+              </a:solidFill>
+              <a:latin typeface="Roboto"/>
+              <a:ea typeface="Roboto"/>
+              <a:cs typeface="Roboto"/>
+              <a:sym typeface="Roboto"/>
+            </a:endParaRPr>
+          </a:p>
+          <a:p>
+            <a:pPr marL="76200" marR="38100" lvl="0" indent="0" algn="l" rtl="0">
+              <a:lnSpc>
+                <a:spcPct val="160000"/>
+              </a:lnSpc>
+              <a:spcBef>
+                <a:spcPts val="600"/>
+              </a:spcBef>
+              <a:spcAft>
+                <a:spcPts val="0"/>
+              </a:spcAft>
+              <a:buClr>
+                <a:schemeClr val="dk1"/>
+              </a:buClr>
+              <a:buSzPts val="1100"/>
+              <a:buFont typeface="Arial"/>
+              <a:buNone/>
+            </a:pPr>
+            <a:endParaRPr sz="1200" dirty="0">
+              <a:solidFill>
+                <a:srgbClr val="212121"/>
+              </a:solidFill>
+              <a:latin typeface="Roboto"/>
+              <a:ea typeface="Roboto"/>
+              <a:cs typeface="Roboto"/>
+              <a:sym typeface="Roboto"/>
+            </a:endParaRPr>
+          </a:p>
+          <a:p>
+            <a:pPr marL="0" lvl="0" indent="0" algn="l" rtl="0">
+              <a:lnSpc>
+                <a:spcPct val="115714"/>
+              </a:lnSpc>
+              <a:spcBef>
+                <a:spcPts val="500"/>
+              </a:spcBef>
+              <a:spcAft>
+                <a:spcPts val="0"/>
+              </a:spcAft>
+              <a:buSzPts val="935"/>
+              <a:buNone/>
+            </a:pPr>
+            <a:endParaRPr sz="1676" dirty="0">
+              <a:highlight>
+                <a:srgbClr val="FFFFFE"/>
+              </a:highlight>
+              <a:latin typeface="Courier New"/>
+              <a:ea typeface="Courier New"/>
+              <a:cs typeface="Courier New"/>
+              <a:sym typeface="Courier New"/>
+            </a:endParaRPr>
+          </a:p>
+          <a:p>
+            <a:pPr marL="0" lvl="0" indent="0" algn="l" rtl="0">
+              <a:lnSpc>
+                <a:spcPct val="95000"/>
+              </a:lnSpc>
+              <a:spcBef>
+                <a:spcPts val="0"/>
+              </a:spcBef>
+              <a:spcAft>
+                <a:spcPts val="0"/>
+              </a:spcAft>
+              <a:buSzPts val="935"/>
+              <a:buNone/>
+            </a:pPr>
+            <a:endParaRPr sz="992" dirty="0">
+              <a:solidFill>
+                <a:srgbClr val="212121"/>
+              </a:solidFill>
+              <a:highlight>
+                <a:srgbClr val="FFFFFF"/>
+              </a:highlight>
+              <a:latin typeface="Courier New"/>
+              <a:ea typeface="Courier New"/>
+              <a:cs typeface="Courier New"/>
+              <a:sym typeface="Courier New"/>
+            </a:endParaRPr>
+          </a:p>
+          <a:p>
+            <a:pPr marL="0" marR="76200" lvl="0" indent="0" algn="l" rtl="0">
+              <a:lnSpc>
+                <a:spcPct val="115714"/>
+              </a:lnSpc>
+              <a:spcBef>
+                <a:spcPts val="800"/>
+              </a:spcBef>
+              <a:spcAft>
+                <a:spcPts val="0"/>
+              </a:spcAft>
+              <a:buSzPts val="935"/>
+              <a:buNone/>
+            </a:pPr>
+            <a:endParaRPr sz="992" dirty="0">
+              <a:highlight>
+                <a:srgbClr val="F7F7F7"/>
+              </a:highlight>
+              <a:latin typeface="Courier New"/>
+              <a:ea typeface="Courier New"/>
+              <a:cs typeface="Courier New"/>
+              <a:sym typeface="Courier New"/>
+            </a:endParaRPr>
+          </a:p>
+          <a:p>
+            <a:pPr marL="0" marR="76200" lvl="0" indent="0" algn="l" rtl="0">
+              <a:lnSpc>
+                <a:spcPct val="115714"/>
+              </a:lnSpc>
+              <a:spcBef>
+                <a:spcPts val="800"/>
+              </a:spcBef>
+              <a:spcAft>
+                <a:spcPts val="0"/>
+              </a:spcAft>
+              <a:buSzPts val="935"/>
+              <a:buNone/>
+            </a:pPr>
+            <a:endParaRPr sz="992" dirty="0">
+              <a:highlight>
+                <a:srgbClr val="F7F7F7"/>
+              </a:highlight>
+              <a:latin typeface="Courier New"/>
+              <a:ea typeface="Courier New"/>
+              <a:cs typeface="Courier New"/>
+              <a:sym typeface="Courier New"/>
+            </a:endParaRPr>
+          </a:p>
+          <a:p>
+            <a:pPr marL="0" lvl="0" indent="0" algn="l" rtl="0">
+              <a:lnSpc>
+                <a:spcPct val="70000"/>
+              </a:lnSpc>
+              <a:spcBef>
+                <a:spcPts val="1000"/>
+              </a:spcBef>
+              <a:spcAft>
+                <a:spcPts val="0"/>
+              </a:spcAft>
+              <a:buClr>
+                <a:schemeClr val="dk1"/>
+              </a:buClr>
+              <a:buSzPts val="935"/>
+              <a:buFont typeface="Arial"/>
+              <a:buNone/>
+            </a:pPr>
+            <a:endParaRPr sz="2480" dirty="0"/>
+          </a:p>
+          <a:p>
+            <a:pPr marL="0" lvl="0" indent="0" algn="l" rtl="0">
+              <a:lnSpc>
+                <a:spcPct val="70000"/>
+              </a:lnSpc>
+              <a:spcBef>
+                <a:spcPts val="1000"/>
+              </a:spcBef>
+              <a:spcAft>
+                <a:spcPts val="0"/>
+              </a:spcAft>
+              <a:buSzPts val="935"/>
+              <a:buNone/>
+            </a:pPr>
+            <a:endParaRPr sz="2480" dirty="0"/>
           </a:p>
         </p:txBody>
       </p:sp>

</xml_diff>